<commit_message>
Added model to documentation
</commit_message>
<xml_diff>
--- a/doc/Visuals.pptx
+++ b/doc/Visuals.pptx
@@ -105,6 +105,11 @@
       </a:defRPr>
     </a:lvl9pPr>
   </p:defaultTextStyle>
+  <p:extLst>
+    <p:ext uri="{EFAFB233-063F-42B5-8137-9DF3F51BA10A}">
+      <p15:sldGuideLst xmlns:p15="http://schemas.microsoft.com/office/powerpoint/2012/main"/>
+    </p:ext>
+  </p:extLst>
 </p:presentation>
 </file>
 
@@ -257,7 +262,7 @@
           <a:p>
             <a:fld id="{64C701B7-E1D4-4A4D-8072-B7E76FEBFBD6}" type="datetimeFigureOut">
               <a:rPr lang="de-CH" smtClean="0"/>
-              <a:t>25.07.2019</a:t>
+              <a:t>26.07.2019</a:t>
             </a:fld>
             <a:endParaRPr lang="de-CH"/>
           </a:p>
@@ -457,7 +462,7 @@
           <a:p>
             <a:fld id="{64C701B7-E1D4-4A4D-8072-B7E76FEBFBD6}" type="datetimeFigureOut">
               <a:rPr lang="de-CH" smtClean="0"/>
-              <a:t>25.07.2019</a:t>
+              <a:t>26.07.2019</a:t>
             </a:fld>
             <a:endParaRPr lang="de-CH"/>
           </a:p>
@@ -667,7 +672,7 @@
           <a:p>
             <a:fld id="{64C701B7-E1D4-4A4D-8072-B7E76FEBFBD6}" type="datetimeFigureOut">
               <a:rPr lang="de-CH" smtClean="0"/>
-              <a:t>25.07.2019</a:t>
+              <a:t>26.07.2019</a:t>
             </a:fld>
             <a:endParaRPr lang="de-CH"/>
           </a:p>
@@ -867,7 +872,7 @@
           <a:p>
             <a:fld id="{64C701B7-E1D4-4A4D-8072-B7E76FEBFBD6}" type="datetimeFigureOut">
               <a:rPr lang="de-CH" smtClean="0"/>
-              <a:t>25.07.2019</a:t>
+              <a:t>26.07.2019</a:t>
             </a:fld>
             <a:endParaRPr lang="de-CH"/>
           </a:p>
@@ -1143,7 +1148,7 @@
           <a:p>
             <a:fld id="{64C701B7-E1D4-4A4D-8072-B7E76FEBFBD6}" type="datetimeFigureOut">
               <a:rPr lang="de-CH" smtClean="0"/>
-              <a:t>25.07.2019</a:t>
+              <a:t>26.07.2019</a:t>
             </a:fld>
             <a:endParaRPr lang="de-CH"/>
           </a:p>
@@ -1411,7 +1416,7 @@
           <a:p>
             <a:fld id="{64C701B7-E1D4-4A4D-8072-B7E76FEBFBD6}" type="datetimeFigureOut">
               <a:rPr lang="de-CH" smtClean="0"/>
-              <a:t>25.07.2019</a:t>
+              <a:t>26.07.2019</a:t>
             </a:fld>
             <a:endParaRPr lang="de-CH"/>
           </a:p>
@@ -1826,7 +1831,7 @@
           <a:p>
             <a:fld id="{64C701B7-E1D4-4A4D-8072-B7E76FEBFBD6}" type="datetimeFigureOut">
               <a:rPr lang="de-CH" smtClean="0"/>
-              <a:t>25.07.2019</a:t>
+              <a:t>26.07.2019</a:t>
             </a:fld>
             <a:endParaRPr lang="de-CH"/>
           </a:p>
@@ -1968,7 +1973,7 @@
           <a:p>
             <a:fld id="{64C701B7-E1D4-4A4D-8072-B7E76FEBFBD6}" type="datetimeFigureOut">
               <a:rPr lang="de-CH" smtClean="0"/>
-              <a:t>25.07.2019</a:t>
+              <a:t>26.07.2019</a:t>
             </a:fld>
             <a:endParaRPr lang="de-CH"/>
           </a:p>
@@ -2081,7 +2086,7 @@
           <a:p>
             <a:fld id="{64C701B7-E1D4-4A4D-8072-B7E76FEBFBD6}" type="datetimeFigureOut">
               <a:rPr lang="de-CH" smtClean="0"/>
-              <a:t>25.07.2019</a:t>
+              <a:t>26.07.2019</a:t>
             </a:fld>
             <a:endParaRPr lang="de-CH"/>
           </a:p>
@@ -2394,7 +2399,7 @@
           <a:p>
             <a:fld id="{64C701B7-E1D4-4A4D-8072-B7E76FEBFBD6}" type="datetimeFigureOut">
               <a:rPr lang="de-CH" smtClean="0"/>
-              <a:t>25.07.2019</a:t>
+              <a:t>26.07.2019</a:t>
             </a:fld>
             <a:endParaRPr lang="de-CH"/>
           </a:p>
@@ -2683,7 +2688,7 @@
           <a:p>
             <a:fld id="{64C701B7-E1D4-4A4D-8072-B7E76FEBFBD6}" type="datetimeFigureOut">
               <a:rPr lang="de-CH" smtClean="0"/>
-              <a:t>25.07.2019</a:t>
+              <a:t>26.07.2019</a:t>
             </a:fld>
             <a:endParaRPr lang="de-CH"/>
           </a:p>
@@ -2926,7 +2931,7 @@
           <a:p>
             <a:fld id="{64C701B7-E1D4-4A4D-8072-B7E76FEBFBD6}" type="datetimeFigureOut">
               <a:rPr lang="de-CH" smtClean="0"/>
-              <a:t>25.07.2019</a:t>
+              <a:t>26.07.2019</a:t>
             </a:fld>
             <a:endParaRPr lang="de-CH"/>
           </a:p>
@@ -3357,7 +3362,7 @@
         </p:nvGrpSpPr>
         <p:grpSpPr>
           <a:xfrm>
-            <a:off x="9150350" y="628650"/>
+            <a:off x="8412418" y="628650"/>
             <a:ext cx="1300163" cy="1257300"/>
             <a:chOff x="4019550" y="1162050"/>
             <a:chExt cx="1300163" cy="1257300"/>
@@ -3405,9 +3410,10 @@
             <a:lstStyle/>
             <a:p>
               <a:r>
-                <a:rPr lang="de-CH" sz="1000" dirty="0"/>
-                <a:t>Entität</a:t>
+                <a:rPr lang="de-CH" sz="1000" dirty="0" err="1"/>
+                <a:t>procman</a:t>
               </a:r>
+              <a:endParaRPr lang="de-CH" sz="1000" dirty="0"/>
             </a:p>
           </p:txBody>
         </p:sp>
@@ -3451,8 +3457,12 @@
             <a:lstStyle/>
             <a:p>
               <a:r>
+                <a:rPr lang="de-CH" sz="1000" dirty="0" err="1"/>
+                <a:t>id</a:t>
+              </a:r>
+              <a:r>
                 <a:rPr lang="de-CH" sz="1000" dirty="0"/>
-                <a:t>Attribut (PK / FK)</a:t>
+                <a:t> (PK)</a:t>
               </a:r>
             </a:p>
           </p:txBody>
@@ -3497,9 +3507,10 @@
             <a:lstStyle/>
             <a:p>
               <a:r>
-                <a:rPr lang="de-CH" sz="1000" dirty="0"/>
-                <a:t>Attribut</a:t>
+                <a:rPr lang="de-CH" sz="1000" dirty="0" err="1"/>
+                <a:t>name</a:t>
               </a:r>
+              <a:endParaRPr lang="de-CH" sz="1000" dirty="0"/>
             </a:p>
           </p:txBody>
         </p:sp>
@@ -3542,10 +3553,7 @@
             <a:bodyPr rtlCol="0" anchor="ctr"/>
             <a:lstStyle/>
             <a:p>
-              <a:r>
-                <a:rPr lang="de-CH" sz="1000" dirty="0"/>
-                <a:t>Attribut</a:t>
-              </a:r>
+              <a:endParaRPr lang="de-CH" sz="1000" dirty="0"/>
             </a:p>
           </p:txBody>
         </p:sp>
@@ -3698,9 +3706,10 @@
             <a:lstStyle/>
             <a:p>
               <a:r>
-                <a:rPr lang="de-CH" sz="1000" dirty="0"/>
-                <a:t>Entität</a:t>
+                <a:rPr lang="de-CH" sz="1000" dirty="0" err="1"/>
+                <a:t>purchase</a:t>
               </a:r>
+              <a:endParaRPr lang="de-CH" sz="1000" dirty="0"/>
             </a:p>
           </p:txBody>
         </p:sp>
@@ -3744,8 +3753,12 @@
             <a:lstStyle/>
             <a:p>
               <a:r>
+                <a:rPr lang="de-CH" sz="1000" dirty="0" err="1"/>
+                <a:t>id</a:t>
+              </a:r>
+              <a:r>
                 <a:rPr lang="de-CH" sz="1000" dirty="0"/>
-                <a:t>Attribut (PK / FK)</a:t>
+                <a:t> (PK)</a:t>
               </a:r>
             </a:p>
           </p:txBody>
@@ -3790,8 +3803,12 @@
             <a:lstStyle/>
             <a:p>
               <a:r>
+                <a:rPr lang="de-CH" sz="1000" dirty="0" err="1"/>
+                <a:t>procmanid</a:t>
+              </a:r>
+              <a:r>
                 <a:rPr lang="de-CH" sz="1000" dirty="0"/>
-                <a:t>Attribut</a:t>
+                <a:t> (FK)</a:t>
               </a:r>
             </a:p>
           </p:txBody>
@@ -3836,8 +3853,12 @@
             <a:lstStyle/>
             <a:p>
               <a:r>
+                <a:rPr lang="de-CH" sz="1000" dirty="0" err="1"/>
+                <a:t>prodid</a:t>
+              </a:r>
+              <a:r>
                 <a:rPr lang="de-CH" sz="1000" dirty="0"/>
-                <a:t>Attribut</a:t>
+                <a:t> (FK)</a:t>
               </a:r>
             </a:p>
           </p:txBody>
@@ -3881,7 +3902,10 @@
             <a:bodyPr rtlCol="0" anchor="ctr"/>
             <a:lstStyle/>
             <a:p>
-              <a:endParaRPr lang="de-CH" sz="1000" dirty="0"/>
+              <a:r>
+                <a:rPr lang="de-CH" sz="1000" dirty="0"/>
+                <a:t>date</a:t>
+              </a:r>
             </a:p>
           </p:txBody>
         </p:sp>
@@ -3924,6 +3948,10 @@
             <a:bodyPr rtlCol="0" anchor="ctr"/>
             <a:lstStyle/>
             <a:p>
+              <a:r>
+                <a:rPr lang="de-CH" sz="1000" dirty="0" err="1"/>
+                <a:t>effectiveprice</a:t>
+              </a:r>
               <a:endParaRPr lang="de-CH" sz="1000" dirty="0"/>
             </a:p>
           </p:txBody>
@@ -3939,17 +3967,429 @@
             </a:extLst>
           </p:cNvPr>
           <p:cNvCxnSpPr>
-            <a:stCxn id="12" idx="3"/>
-            <a:endCxn id="5" idx="1"/>
+            <a:cxnSpLocks/>
+            <a:stCxn id="14" idx="3"/>
+            <a:endCxn id="6" idx="1"/>
           </p:cNvCxnSpPr>
           <p:nvPr/>
         </p:nvCxnSpPr>
         <p:spPr>
+          <a:xfrm flipV="1">
+            <a:off x="6475413" y="942975"/>
+            <a:ext cx="1937005" cy="209550"/>
+          </a:xfrm>
+          <a:prstGeom prst="bentConnector3">
+            <a:avLst>
+              <a:gd name="adj1" fmla="val 50000"/>
+            </a:avLst>
+          </a:prstGeom>
+        </p:spPr>
+        <p:style>
+          <a:lnRef idx="2">
+            <a:schemeClr val="dk1"/>
+          </a:lnRef>
+          <a:fillRef idx="0">
+            <a:schemeClr val="dk1"/>
+          </a:fillRef>
+          <a:effectRef idx="1">
+            <a:schemeClr val="dk1"/>
+          </a:effectRef>
+          <a:fontRef idx="minor">
+            <a:schemeClr val="tx1"/>
+          </a:fontRef>
+        </p:style>
+      </p:cxnSp>
+      <p:sp>
+        <p:nvSpPr>
+          <p:cNvPr id="19" name="Textfeld 18">
+            <a:extLst>
+              <a:ext uri="{FF2B5EF4-FFF2-40B4-BE49-F238E27FC236}">
+                <a16:creationId xmlns:a16="http://schemas.microsoft.com/office/drawing/2014/main" id="{BC7A5140-320E-4AC8-BADD-22342CBC6618}"/>
+              </a:ext>
+            </a:extLst>
+          </p:cNvPr>
+          <p:cNvSpPr txBox="1"/>
+          <p:nvPr/>
+        </p:nvSpPr>
+        <p:spPr>
           <a:xfrm>
-            <a:off x="6475413" y="733425"/>
-            <a:ext cx="2674937" cy="0"/>
+            <a:off x="6473811" y="909250"/>
+            <a:ext cx="264816" cy="276999"/>
           </a:xfrm>
-          <a:prstGeom prst="line">
+          <a:prstGeom prst="rect">
+            <a:avLst/>
+          </a:prstGeom>
+          <a:noFill/>
+        </p:spPr>
+        <p:txBody>
+          <a:bodyPr wrap="none" rtlCol="0">
+            <a:spAutoFit/>
+          </a:bodyPr>
+          <a:lstStyle/>
+          <a:p>
+            <a:r>
+              <a:rPr lang="de-CH" sz="1200" dirty="0"/>
+              <a:t>n</a:t>
+            </a:r>
+          </a:p>
+        </p:txBody>
+      </p:sp>
+      <p:sp>
+        <p:nvSpPr>
+          <p:cNvPr id="20" name="Textfeld 19">
+            <a:extLst>
+              <a:ext uri="{FF2B5EF4-FFF2-40B4-BE49-F238E27FC236}">
+                <a16:creationId xmlns:a16="http://schemas.microsoft.com/office/drawing/2014/main" id="{DA0F5EED-901A-4D2D-9595-D7F71238B420}"/>
+              </a:ext>
+            </a:extLst>
+          </p:cNvPr>
+          <p:cNvSpPr txBox="1"/>
+          <p:nvPr/>
+        </p:nvSpPr>
+        <p:spPr>
+          <a:xfrm>
+            <a:off x="8149204" y="697810"/>
+            <a:ext cx="263214" cy="276999"/>
+          </a:xfrm>
+          <a:prstGeom prst="rect">
+            <a:avLst/>
+          </a:prstGeom>
+          <a:noFill/>
+        </p:spPr>
+        <p:txBody>
+          <a:bodyPr wrap="none" rtlCol="0">
+            <a:spAutoFit/>
+          </a:bodyPr>
+          <a:lstStyle/>
+          <a:p>
+            <a:r>
+              <a:rPr lang="de-CH" sz="1200" dirty="0"/>
+              <a:t>1</a:t>
+            </a:r>
+          </a:p>
+        </p:txBody>
+      </p:sp>
+      <p:grpSp>
+        <p:nvGrpSpPr>
+          <p:cNvPr id="21" name="Gruppieren 20">
+            <a:extLst>
+              <a:ext uri="{FF2B5EF4-FFF2-40B4-BE49-F238E27FC236}">
+                <a16:creationId xmlns:a16="http://schemas.microsoft.com/office/drawing/2014/main" id="{F8213305-8B12-47F7-8BE4-D9B1D9AA9C87}"/>
+              </a:ext>
+            </a:extLst>
+          </p:cNvPr>
+          <p:cNvGrpSpPr/>
+          <p:nvPr/>
+        </p:nvGrpSpPr>
+        <p:grpSpPr>
+          <a:xfrm>
+            <a:off x="2119229" y="628650"/>
+            <a:ext cx="1300163" cy="1257300"/>
+            <a:chOff x="4019550" y="1162050"/>
+            <a:chExt cx="1300163" cy="1257300"/>
+          </a:xfrm>
+        </p:grpSpPr>
+        <p:sp>
+          <p:nvSpPr>
+            <p:cNvPr id="22" name="Rechteck 21">
+              <a:extLst>
+                <a:ext uri="{FF2B5EF4-FFF2-40B4-BE49-F238E27FC236}">
+                  <a16:creationId xmlns:a16="http://schemas.microsoft.com/office/drawing/2014/main" id="{8435126A-E410-4075-9065-DBBB8E59977C}"/>
+                </a:ext>
+              </a:extLst>
+            </p:cNvPr>
+            <p:cNvSpPr/>
+            <p:nvPr/>
+          </p:nvSpPr>
+          <p:spPr>
+            <a:xfrm>
+              <a:off x="4019550" y="1162050"/>
+              <a:ext cx="1300163" cy="209550"/>
+            </a:xfrm>
+            <a:prstGeom prst="rect">
+              <a:avLst/>
+            </a:prstGeom>
+          </p:spPr>
+          <p:style>
+            <a:lnRef idx="2">
+              <a:schemeClr val="dk1">
+                <a:shade val="50000"/>
+              </a:schemeClr>
+            </a:lnRef>
+            <a:fillRef idx="1">
+              <a:schemeClr val="dk1"/>
+            </a:fillRef>
+            <a:effectRef idx="0">
+              <a:schemeClr val="dk1"/>
+            </a:effectRef>
+            <a:fontRef idx="minor">
+              <a:schemeClr val="lt1"/>
+            </a:fontRef>
+          </p:style>
+          <p:txBody>
+            <a:bodyPr rtlCol="0" anchor="ctr"/>
+            <a:lstStyle/>
+            <a:p>
+              <a:r>
+                <a:rPr lang="de-CH" sz="1000" dirty="0" err="1"/>
+                <a:t>product</a:t>
+              </a:r>
+              <a:endParaRPr lang="de-CH" sz="1000" dirty="0"/>
+            </a:p>
+          </p:txBody>
+        </p:sp>
+        <p:sp>
+          <p:nvSpPr>
+            <p:cNvPr id="23" name="Rechteck 22">
+              <a:extLst>
+                <a:ext uri="{FF2B5EF4-FFF2-40B4-BE49-F238E27FC236}">
+                  <a16:creationId xmlns:a16="http://schemas.microsoft.com/office/drawing/2014/main" id="{B6DB79E9-5BBD-4E6B-99FC-24504AEB9EA5}"/>
+                </a:ext>
+              </a:extLst>
+            </p:cNvPr>
+            <p:cNvSpPr/>
+            <p:nvPr/>
+          </p:nvSpPr>
+          <p:spPr>
+            <a:xfrm>
+              <a:off x="4019550" y="1371600"/>
+              <a:ext cx="1300163" cy="209550"/>
+            </a:xfrm>
+            <a:prstGeom prst="rect">
+              <a:avLst/>
+            </a:prstGeom>
+          </p:spPr>
+          <p:style>
+            <a:lnRef idx="2">
+              <a:schemeClr val="dk1"/>
+            </a:lnRef>
+            <a:fillRef idx="1">
+              <a:schemeClr val="lt1"/>
+            </a:fillRef>
+            <a:effectRef idx="0">
+              <a:schemeClr val="dk1"/>
+            </a:effectRef>
+            <a:fontRef idx="minor">
+              <a:schemeClr val="dk1"/>
+            </a:fontRef>
+          </p:style>
+          <p:txBody>
+            <a:bodyPr rtlCol="0" anchor="ctr"/>
+            <a:lstStyle/>
+            <a:p>
+              <a:r>
+                <a:rPr lang="de-CH" sz="1000" dirty="0" err="1"/>
+                <a:t>id</a:t>
+              </a:r>
+              <a:r>
+                <a:rPr lang="de-CH" sz="1000" dirty="0"/>
+                <a:t> (PK)</a:t>
+              </a:r>
+            </a:p>
+          </p:txBody>
+        </p:sp>
+        <p:sp>
+          <p:nvSpPr>
+            <p:cNvPr id="24" name="Rechteck 23">
+              <a:extLst>
+                <a:ext uri="{FF2B5EF4-FFF2-40B4-BE49-F238E27FC236}">
+                  <a16:creationId xmlns:a16="http://schemas.microsoft.com/office/drawing/2014/main" id="{0901C970-29C5-4E1D-8F19-0FCA1B49A686}"/>
+                </a:ext>
+              </a:extLst>
+            </p:cNvPr>
+            <p:cNvSpPr/>
+            <p:nvPr/>
+          </p:nvSpPr>
+          <p:spPr>
+            <a:xfrm>
+              <a:off x="4019550" y="1581150"/>
+              <a:ext cx="1300163" cy="209550"/>
+            </a:xfrm>
+            <a:prstGeom prst="rect">
+              <a:avLst/>
+            </a:prstGeom>
+          </p:spPr>
+          <p:style>
+            <a:lnRef idx="2">
+              <a:schemeClr val="dk1"/>
+            </a:lnRef>
+            <a:fillRef idx="1">
+              <a:schemeClr val="lt1"/>
+            </a:fillRef>
+            <a:effectRef idx="0">
+              <a:schemeClr val="dk1"/>
+            </a:effectRef>
+            <a:fontRef idx="minor">
+              <a:schemeClr val="dk1"/>
+            </a:fontRef>
+          </p:style>
+          <p:txBody>
+            <a:bodyPr rtlCol="0" anchor="ctr"/>
+            <a:lstStyle/>
+            <a:p>
+              <a:r>
+                <a:rPr lang="de-CH" sz="1000" dirty="0" err="1"/>
+                <a:t>name</a:t>
+              </a:r>
+              <a:endParaRPr lang="de-CH" sz="1000" dirty="0"/>
+            </a:p>
+          </p:txBody>
+        </p:sp>
+        <p:sp>
+          <p:nvSpPr>
+            <p:cNvPr id="25" name="Rechteck 24">
+              <a:extLst>
+                <a:ext uri="{FF2B5EF4-FFF2-40B4-BE49-F238E27FC236}">
+                  <a16:creationId xmlns:a16="http://schemas.microsoft.com/office/drawing/2014/main" id="{A4F0E0F4-23E2-46FC-94B4-D31239D42A9C}"/>
+                </a:ext>
+              </a:extLst>
+            </p:cNvPr>
+            <p:cNvSpPr/>
+            <p:nvPr/>
+          </p:nvSpPr>
+          <p:spPr>
+            <a:xfrm>
+              <a:off x="4019550" y="1790700"/>
+              <a:ext cx="1300163" cy="209550"/>
+            </a:xfrm>
+            <a:prstGeom prst="rect">
+              <a:avLst/>
+            </a:prstGeom>
+          </p:spPr>
+          <p:style>
+            <a:lnRef idx="2">
+              <a:schemeClr val="dk1"/>
+            </a:lnRef>
+            <a:fillRef idx="1">
+              <a:schemeClr val="lt1"/>
+            </a:fillRef>
+            <a:effectRef idx="0">
+              <a:schemeClr val="dk1"/>
+            </a:effectRef>
+            <a:fontRef idx="minor">
+              <a:schemeClr val="dk1"/>
+            </a:fontRef>
+          </p:style>
+          <p:txBody>
+            <a:bodyPr rtlCol="0" anchor="ctr"/>
+            <a:lstStyle/>
+            <a:p>
+              <a:r>
+                <a:rPr lang="de-CH" sz="1000" dirty="0" err="1"/>
+                <a:t>listprice</a:t>
+              </a:r>
+              <a:endParaRPr lang="de-CH" sz="1000" dirty="0"/>
+            </a:p>
+          </p:txBody>
+        </p:sp>
+        <p:sp>
+          <p:nvSpPr>
+            <p:cNvPr id="26" name="Rechteck 25">
+              <a:extLst>
+                <a:ext uri="{FF2B5EF4-FFF2-40B4-BE49-F238E27FC236}">
+                  <a16:creationId xmlns:a16="http://schemas.microsoft.com/office/drawing/2014/main" id="{093E205E-B168-4788-975E-A4E5E0A6A318}"/>
+                </a:ext>
+              </a:extLst>
+            </p:cNvPr>
+            <p:cNvSpPr/>
+            <p:nvPr/>
+          </p:nvSpPr>
+          <p:spPr>
+            <a:xfrm>
+              <a:off x="4019550" y="2000250"/>
+              <a:ext cx="1300163" cy="209550"/>
+            </a:xfrm>
+            <a:prstGeom prst="rect">
+              <a:avLst/>
+            </a:prstGeom>
+          </p:spPr>
+          <p:style>
+            <a:lnRef idx="2">
+              <a:schemeClr val="dk1"/>
+            </a:lnRef>
+            <a:fillRef idx="1">
+              <a:schemeClr val="lt1"/>
+            </a:fillRef>
+            <a:effectRef idx="0">
+              <a:schemeClr val="dk1"/>
+            </a:effectRef>
+            <a:fontRef idx="minor">
+              <a:schemeClr val="dk1"/>
+            </a:fontRef>
+          </p:style>
+          <p:txBody>
+            <a:bodyPr rtlCol="0" anchor="ctr"/>
+            <a:lstStyle/>
+            <a:p>
+              <a:endParaRPr lang="de-CH" sz="1000" dirty="0"/>
+            </a:p>
+          </p:txBody>
+        </p:sp>
+        <p:sp>
+          <p:nvSpPr>
+            <p:cNvPr id="27" name="Rechteck 26">
+              <a:extLst>
+                <a:ext uri="{FF2B5EF4-FFF2-40B4-BE49-F238E27FC236}">
+                  <a16:creationId xmlns:a16="http://schemas.microsoft.com/office/drawing/2014/main" id="{5F726D3C-C4D1-4E92-8B9B-C30F989E36AC}"/>
+                </a:ext>
+              </a:extLst>
+            </p:cNvPr>
+            <p:cNvSpPr/>
+            <p:nvPr/>
+          </p:nvSpPr>
+          <p:spPr>
+            <a:xfrm>
+              <a:off x="4019550" y="2209800"/>
+              <a:ext cx="1300163" cy="209550"/>
+            </a:xfrm>
+            <a:prstGeom prst="rect">
+              <a:avLst/>
+            </a:prstGeom>
+          </p:spPr>
+          <p:style>
+            <a:lnRef idx="2">
+              <a:schemeClr val="dk1"/>
+            </a:lnRef>
+            <a:fillRef idx="1">
+              <a:schemeClr val="lt1"/>
+            </a:fillRef>
+            <a:effectRef idx="0">
+              <a:schemeClr val="dk1"/>
+            </a:effectRef>
+            <a:fontRef idx="minor">
+              <a:schemeClr val="dk1"/>
+            </a:fontRef>
+          </p:style>
+          <p:txBody>
+            <a:bodyPr rtlCol="0" anchor="ctr"/>
+            <a:lstStyle/>
+            <a:p>
+              <a:endParaRPr lang="de-CH" sz="1000" dirty="0"/>
+            </a:p>
+          </p:txBody>
+        </p:sp>
+      </p:grpSp>
+      <p:cxnSp>
+        <p:nvCxnSpPr>
+          <p:cNvPr id="29" name="Verbinder: gewinkelt 28">
+            <a:extLst>
+              <a:ext uri="{FF2B5EF4-FFF2-40B4-BE49-F238E27FC236}">
+                <a16:creationId xmlns:a16="http://schemas.microsoft.com/office/drawing/2014/main" id="{A3588422-92C2-49A6-AA71-3BE2A23CC308}"/>
+              </a:ext>
+            </a:extLst>
+          </p:cNvPr>
+          <p:cNvCxnSpPr>
+            <a:stCxn id="15" idx="1"/>
+            <a:endCxn id="23" idx="3"/>
+          </p:cNvCxnSpPr>
+          <p:nvPr/>
+        </p:nvCxnSpPr>
+        <p:spPr>
+          <a:xfrm rot="10800000">
+            <a:off x="3419392" y="942975"/>
+            <a:ext cx="1755858" cy="419100"/>
+          </a:xfrm>
+          <a:prstGeom prst="bentConnector3">
             <a:avLst/>
           </a:prstGeom>
         </p:spPr>
@@ -3970,10 +4410,10 @@
       </p:cxnSp>
       <p:sp>
         <p:nvSpPr>
-          <p:cNvPr id="19" name="Textfeld 18">
-            <a:extLst>
-              <a:ext uri="{FF2B5EF4-FFF2-40B4-BE49-F238E27FC236}">
-                <a16:creationId xmlns:a16="http://schemas.microsoft.com/office/drawing/2014/main" id="{BC7A5140-320E-4AC8-BADD-22342CBC6618}"/>
+          <p:cNvPr id="30" name="Textfeld 29">
+            <a:extLst>
+              <a:ext uri="{FF2B5EF4-FFF2-40B4-BE49-F238E27FC236}">
+                <a16:creationId xmlns:a16="http://schemas.microsoft.com/office/drawing/2014/main" id="{8469C950-724A-4CC4-86EC-06201DB3CD08}"/>
               </a:ext>
             </a:extLst>
           </p:cNvPr>
@@ -3982,7 +4422,42 @@
         </p:nvSpPr>
         <p:spPr>
           <a:xfrm>
-            <a:off x="6475413" y="771525"/>
+            <a:off x="4870726" y="1052011"/>
+            <a:ext cx="264816" cy="276999"/>
+          </a:xfrm>
+          <a:prstGeom prst="rect">
+            <a:avLst/>
+          </a:prstGeom>
+          <a:noFill/>
+        </p:spPr>
+        <p:txBody>
+          <a:bodyPr wrap="none" rtlCol="0">
+            <a:spAutoFit/>
+          </a:bodyPr>
+          <a:lstStyle/>
+          <a:p>
+            <a:r>
+              <a:rPr lang="de-CH" sz="1200" dirty="0"/>
+              <a:t>n</a:t>
+            </a:r>
+          </a:p>
+        </p:txBody>
+      </p:sp>
+      <p:sp>
+        <p:nvSpPr>
+          <p:cNvPr id="31" name="Textfeld 30">
+            <a:extLst>
+              <a:ext uri="{FF2B5EF4-FFF2-40B4-BE49-F238E27FC236}">
+                <a16:creationId xmlns:a16="http://schemas.microsoft.com/office/drawing/2014/main" id="{F8F410FD-0AC0-4A58-9C06-972DEBCD1712}"/>
+              </a:ext>
+            </a:extLst>
+          </p:cNvPr>
+          <p:cNvSpPr txBox="1"/>
+          <p:nvPr/>
+        </p:nvSpPr>
+        <p:spPr>
+          <a:xfrm>
+            <a:off x="3442961" y="650822"/>
             <a:ext cx="263214" cy="276999"/>
           </a:xfrm>
           <a:prstGeom prst="rect">
@@ -4005,35 +4480,52 @@
       </p:sp>
       <p:sp>
         <p:nvSpPr>
-          <p:cNvPr id="20" name="Textfeld 19">
-            <a:extLst>
-              <a:ext uri="{FF2B5EF4-FFF2-40B4-BE49-F238E27FC236}">
-                <a16:creationId xmlns:a16="http://schemas.microsoft.com/office/drawing/2014/main" id="{DA0F5EED-901A-4D2D-9595-D7F71238B420}"/>
-              </a:ext>
-            </a:extLst>
-          </p:cNvPr>
-          <p:cNvSpPr txBox="1"/>
+          <p:cNvPr id="32" name="Sprechblase: rechteckig 31">
+            <a:extLst>
+              <a:ext uri="{FF2B5EF4-FFF2-40B4-BE49-F238E27FC236}">
+                <a16:creationId xmlns:a16="http://schemas.microsoft.com/office/drawing/2014/main" id="{244FA17C-763C-4C57-B712-806E8645DE67}"/>
+              </a:ext>
+            </a:extLst>
+          </p:cNvPr>
+          <p:cNvSpPr/>
           <p:nvPr/>
         </p:nvSpPr>
         <p:spPr>
           <a:xfrm>
-            <a:off x="8887136" y="771525"/>
-            <a:ext cx="263214" cy="276999"/>
+            <a:off x="4451683" y="2366733"/>
+            <a:ext cx="1227221" cy="729916"/>
           </a:xfrm>
-          <a:prstGeom prst="rect">
-            <a:avLst/>
+          <a:prstGeom prst="wedgeRectCallout">
+            <a:avLst>
+              <a:gd name="adj1" fmla="val 23612"/>
+              <a:gd name="adj2" fmla="val -116621"/>
+            </a:avLst>
           </a:prstGeom>
-          <a:noFill/>
         </p:spPr>
-        <p:txBody>
-          <a:bodyPr wrap="none" rtlCol="0">
-            <a:spAutoFit/>
-          </a:bodyPr>
-          <a:lstStyle/>
-          <a:p>
-            <a:r>
-              <a:rPr lang="de-CH" sz="1200" dirty="0"/>
-              <a:t>n</a:t>
+        <p:style>
+          <a:lnRef idx="2">
+            <a:schemeClr val="accent4">
+              <a:shade val="50000"/>
+            </a:schemeClr>
+          </a:lnRef>
+          <a:fillRef idx="1">
+            <a:schemeClr val="accent4"/>
+          </a:fillRef>
+          <a:effectRef idx="0">
+            <a:schemeClr val="accent4"/>
+          </a:effectRef>
+          <a:fontRef idx="minor">
+            <a:schemeClr val="lt1"/>
+          </a:fontRef>
+        </p:style>
+        <p:txBody>
+          <a:bodyPr rtlCol="0" anchor="ctr"/>
+          <a:lstStyle/>
+          <a:p>
+            <a:pPr algn="ctr"/>
+            <a:r>
+              <a:rPr lang="de-CH" sz="1000" dirty="0"/>
+              <a:t>Der effektiv bezahlte Preis kann sich von dem Listenpreis unterscheiden</a:t>
             </a:r>
           </a:p>
         </p:txBody>

</xml_diff>

<commit_message>
added purchase model in frontend and backend.
</commit_message>
<xml_diff>
--- a/doc/Visuals.pptx
+++ b/doc/Visuals.pptx
@@ -262,7 +262,7 @@
           <a:p>
             <a:fld id="{64C701B7-E1D4-4A4D-8072-B7E76FEBFBD6}" type="datetimeFigureOut">
               <a:rPr lang="de-CH" smtClean="0"/>
-              <a:t>26.07.2019</a:t>
+              <a:t>28.07.2019</a:t>
             </a:fld>
             <a:endParaRPr lang="de-CH"/>
           </a:p>
@@ -462,7 +462,7 @@
           <a:p>
             <a:fld id="{64C701B7-E1D4-4A4D-8072-B7E76FEBFBD6}" type="datetimeFigureOut">
               <a:rPr lang="de-CH" smtClean="0"/>
-              <a:t>26.07.2019</a:t>
+              <a:t>28.07.2019</a:t>
             </a:fld>
             <a:endParaRPr lang="de-CH"/>
           </a:p>
@@ -672,7 +672,7 @@
           <a:p>
             <a:fld id="{64C701B7-E1D4-4A4D-8072-B7E76FEBFBD6}" type="datetimeFigureOut">
               <a:rPr lang="de-CH" smtClean="0"/>
-              <a:t>26.07.2019</a:t>
+              <a:t>28.07.2019</a:t>
             </a:fld>
             <a:endParaRPr lang="de-CH"/>
           </a:p>
@@ -872,7 +872,7 @@
           <a:p>
             <a:fld id="{64C701B7-E1D4-4A4D-8072-B7E76FEBFBD6}" type="datetimeFigureOut">
               <a:rPr lang="de-CH" smtClean="0"/>
-              <a:t>26.07.2019</a:t>
+              <a:t>28.07.2019</a:t>
             </a:fld>
             <a:endParaRPr lang="de-CH"/>
           </a:p>
@@ -1148,7 +1148,7 @@
           <a:p>
             <a:fld id="{64C701B7-E1D4-4A4D-8072-B7E76FEBFBD6}" type="datetimeFigureOut">
               <a:rPr lang="de-CH" smtClean="0"/>
-              <a:t>26.07.2019</a:t>
+              <a:t>28.07.2019</a:t>
             </a:fld>
             <a:endParaRPr lang="de-CH"/>
           </a:p>
@@ -1416,7 +1416,7 @@
           <a:p>
             <a:fld id="{64C701B7-E1D4-4A4D-8072-B7E76FEBFBD6}" type="datetimeFigureOut">
               <a:rPr lang="de-CH" smtClean="0"/>
-              <a:t>26.07.2019</a:t>
+              <a:t>28.07.2019</a:t>
             </a:fld>
             <a:endParaRPr lang="de-CH"/>
           </a:p>
@@ -1831,7 +1831,7 @@
           <a:p>
             <a:fld id="{64C701B7-E1D4-4A4D-8072-B7E76FEBFBD6}" type="datetimeFigureOut">
               <a:rPr lang="de-CH" smtClean="0"/>
-              <a:t>26.07.2019</a:t>
+              <a:t>28.07.2019</a:t>
             </a:fld>
             <a:endParaRPr lang="de-CH"/>
           </a:p>
@@ -1973,7 +1973,7 @@
           <a:p>
             <a:fld id="{64C701B7-E1D4-4A4D-8072-B7E76FEBFBD6}" type="datetimeFigureOut">
               <a:rPr lang="de-CH" smtClean="0"/>
-              <a:t>26.07.2019</a:t>
+              <a:t>28.07.2019</a:t>
             </a:fld>
             <a:endParaRPr lang="de-CH"/>
           </a:p>
@@ -2086,7 +2086,7 @@
           <a:p>
             <a:fld id="{64C701B7-E1D4-4A4D-8072-B7E76FEBFBD6}" type="datetimeFigureOut">
               <a:rPr lang="de-CH" smtClean="0"/>
-              <a:t>26.07.2019</a:t>
+              <a:t>28.07.2019</a:t>
             </a:fld>
             <a:endParaRPr lang="de-CH"/>
           </a:p>
@@ -2399,7 +2399,7 @@
           <a:p>
             <a:fld id="{64C701B7-E1D4-4A4D-8072-B7E76FEBFBD6}" type="datetimeFigureOut">
               <a:rPr lang="de-CH" smtClean="0"/>
-              <a:t>26.07.2019</a:t>
+              <a:t>28.07.2019</a:t>
             </a:fld>
             <a:endParaRPr lang="de-CH"/>
           </a:p>
@@ -2688,7 +2688,7 @@
           <a:p>
             <a:fld id="{64C701B7-E1D4-4A4D-8072-B7E76FEBFBD6}" type="datetimeFigureOut">
               <a:rPr lang="de-CH" smtClean="0"/>
-              <a:t>26.07.2019</a:t>
+              <a:t>28.07.2019</a:t>
             </a:fld>
             <a:endParaRPr lang="de-CH"/>
           </a:p>
@@ -2931,7 +2931,7 @@
           <a:p>
             <a:fld id="{64C701B7-E1D4-4A4D-8072-B7E76FEBFBD6}" type="datetimeFigureOut">
               <a:rPr lang="de-CH" smtClean="0"/>
-              <a:t>26.07.2019</a:t>
+              <a:t>28.07.2019</a:t>
             </a:fld>
             <a:endParaRPr lang="de-CH"/>
           </a:p>
@@ -3804,7 +3804,7 @@
             <a:p>
               <a:r>
                 <a:rPr lang="de-CH" sz="1000" dirty="0" err="1"/>
-                <a:t>procmanid</a:t>
+                <a:t>procmanId</a:t>
               </a:r>
               <a:r>
                 <a:rPr lang="de-CH" sz="1000" dirty="0"/>
@@ -3854,7 +3854,7 @@
             <a:p>
               <a:r>
                 <a:rPr lang="de-CH" sz="1000" dirty="0" err="1"/>
-                <a:t>prodid</a:t>
+                <a:t>prodId</a:t>
               </a:r>
               <a:r>
                 <a:rPr lang="de-CH" sz="1000" dirty="0"/>
@@ -4526,6 +4526,373 @@
             <a:r>
               <a:rPr lang="de-CH" sz="1000" dirty="0"/>
               <a:t>Der effektiv bezahlte Preis kann sich von dem Listenpreis unterscheiden</a:t>
+            </a:r>
+          </a:p>
+        </p:txBody>
+      </p:sp>
+      <p:grpSp>
+        <p:nvGrpSpPr>
+          <p:cNvPr id="33" name="Gruppieren 32">
+            <a:extLst>
+              <a:ext uri="{FF2B5EF4-FFF2-40B4-BE49-F238E27FC236}">
+                <a16:creationId xmlns:a16="http://schemas.microsoft.com/office/drawing/2014/main" id="{C7577AB4-6BEA-48D3-9761-1B9D15C0CA39}"/>
+              </a:ext>
+            </a:extLst>
+          </p:cNvPr>
+          <p:cNvGrpSpPr/>
+          <p:nvPr/>
+        </p:nvGrpSpPr>
+        <p:grpSpPr>
+          <a:xfrm>
+            <a:off x="5175250" y="3861135"/>
+            <a:ext cx="1300163" cy="1257300"/>
+            <a:chOff x="4019550" y="1162050"/>
+            <a:chExt cx="1300163" cy="1257300"/>
+          </a:xfrm>
+        </p:grpSpPr>
+        <p:sp>
+          <p:nvSpPr>
+            <p:cNvPr id="34" name="Rechteck 33">
+              <a:extLst>
+                <a:ext uri="{FF2B5EF4-FFF2-40B4-BE49-F238E27FC236}">
+                  <a16:creationId xmlns:a16="http://schemas.microsoft.com/office/drawing/2014/main" id="{C1206793-126F-46EE-B7B0-6BA86D4A2046}"/>
+                </a:ext>
+              </a:extLst>
+            </p:cNvPr>
+            <p:cNvSpPr/>
+            <p:nvPr/>
+          </p:nvSpPr>
+          <p:spPr>
+            <a:xfrm>
+              <a:off x="4019550" y="1162050"/>
+              <a:ext cx="1300163" cy="209550"/>
+            </a:xfrm>
+            <a:prstGeom prst="rect">
+              <a:avLst/>
+            </a:prstGeom>
+          </p:spPr>
+          <p:style>
+            <a:lnRef idx="2">
+              <a:schemeClr val="dk1">
+                <a:shade val="50000"/>
+              </a:schemeClr>
+            </a:lnRef>
+            <a:fillRef idx="1">
+              <a:schemeClr val="dk1"/>
+            </a:fillRef>
+            <a:effectRef idx="0">
+              <a:schemeClr val="dk1"/>
+            </a:effectRef>
+            <a:fontRef idx="minor">
+              <a:schemeClr val="lt1"/>
+            </a:fontRef>
+          </p:style>
+          <p:txBody>
+            <a:bodyPr rtlCol="0" anchor="ctr"/>
+            <a:lstStyle/>
+            <a:p>
+              <a:r>
+                <a:rPr lang="de-CH" sz="1000" dirty="0" err="1"/>
+                <a:t>purchasevm</a:t>
+              </a:r>
+              <a:endParaRPr lang="de-CH" sz="1000" dirty="0"/>
+            </a:p>
+          </p:txBody>
+        </p:sp>
+        <p:sp>
+          <p:nvSpPr>
+            <p:cNvPr id="35" name="Rechteck 34">
+              <a:extLst>
+                <a:ext uri="{FF2B5EF4-FFF2-40B4-BE49-F238E27FC236}">
+                  <a16:creationId xmlns:a16="http://schemas.microsoft.com/office/drawing/2014/main" id="{FCAD9107-F87D-496A-95D9-381DFF814ACB}"/>
+                </a:ext>
+              </a:extLst>
+            </p:cNvPr>
+            <p:cNvSpPr/>
+            <p:nvPr/>
+          </p:nvSpPr>
+          <p:spPr>
+            <a:xfrm>
+              <a:off x="4019550" y="1371600"/>
+              <a:ext cx="1300163" cy="209550"/>
+            </a:xfrm>
+            <a:prstGeom prst="rect">
+              <a:avLst/>
+            </a:prstGeom>
+          </p:spPr>
+          <p:style>
+            <a:lnRef idx="2">
+              <a:schemeClr val="dk1"/>
+            </a:lnRef>
+            <a:fillRef idx="1">
+              <a:schemeClr val="lt1"/>
+            </a:fillRef>
+            <a:effectRef idx="0">
+              <a:schemeClr val="dk1"/>
+            </a:effectRef>
+            <a:fontRef idx="minor">
+              <a:schemeClr val="dk1"/>
+            </a:fontRef>
+          </p:style>
+          <p:txBody>
+            <a:bodyPr rtlCol="0" anchor="ctr"/>
+            <a:lstStyle/>
+            <a:p>
+              <a:r>
+                <a:rPr lang="de-CH" sz="1000" dirty="0" err="1"/>
+                <a:t>id</a:t>
+              </a:r>
+              <a:r>
+                <a:rPr lang="de-CH" sz="1000" dirty="0"/>
+                <a:t> (PK)</a:t>
+              </a:r>
+            </a:p>
+          </p:txBody>
+        </p:sp>
+        <p:sp>
+          <p:nvSpPr>
+            <p:cNvPr id="36" name="Rechteck 35">
+              <a:extLst>
+                <a:ext uri="{FF2B5EF4-FFF2-40B4-BE49-F238E27FC236}">
+                  <a16:creationId xmlns:a16="http://schemas.microsoft.com/office/drawing/2014/main" id="{237540CA-6BE8-4147-BCD7-7112534258A1}"/>
+                </a:ext>
+              </a:extLst>
+            </p:cNvPr>
+            <p:cNvSpPr/>
+            <p:nvPr/>
+          </p:nvSpPr>
+          <p:spPr>
+            <a:xfrm>
+              <a:off x="4019550" y="1581150"/>
+              <a:ext cx="1300163" cy="209550"/>
+            </a:xfrm>
+            <a:prstGeom prst="rect">
+              <a:avLst/>
+            </a:prstGeom>
+          </p:spPr>
+          <p:style>
+            <a:lnRef idx="2">
+              <a:schemeClr val="dk1"/>
+            </a:lnRef>
+            <a:fillRef idx="1">
+              <a:schemeClr val="lt1"/>
+            </a:fillRef>
+            <a:effectRef idx="0">
+              <a:schemeClr val="dk1"/>
+            </a:effectRef>
+            <a:fontRef idx="minor">
+              <a:schemeClr val="dk1"/>
+            </a:fontRef>
+          </p:style>
+          <p:txBody>
+            <a:bodyPr rtlCol="0" anchor="ctr"/>
+            <a:lstStyle/>
+            <a:p>
+              <a:r>
+                <a:rPr lang="de-CH" sz="1000" dirty="0" err="1"/>
+                <a:t>procmanName</a:t>
+              </a:r>
+              <a:endParaRPr lang="de-CH" sz="1000" dirty="0"/>
+            </a:p>
+          </p:txBody>
+        </p:sp>
+        <p:sp>
+          <p:nvSpPr>
+            <p:cNvPr id="37" name="Rechteck 36">
+              <a:extLst>
+                <a:ext uri="{FF2B5EF4-FFF2-40B4-BE49-F238E27FC236}">
+                  <a16:creationId xmlns:a16="http://schemas.microsoft.com/office/drawing/2014/main" id="{DC24400B-C74B-47BD-8E3A-49EFE4E19EF2}"/>
+                </a:ext>
+              </a:extLst>
+            </p:cNvPr>
+            <p:cNvSpPr/>
+            <p:nvPr/>
+          </p:nvSpPr>
+          <p:spPr>
+            <a:xfrm>
+              <a:off x="4019550" y="1790700"/>
+              <a:ext cx="1300163" cy="209550"/>
+            </a:xfrm>
+            <a:prstGeom prst="rect">
+              <a:avLst/>
+            </a:prstGeom>
+          </p:spPr>
+          <p:style>
+            <a:lnRef idx="2">
+              <a:schemeClr val="dk1"/>
+            </a:lnRef>
+            <a:fillRef idx="1">
+              <a:schemeClr val="lt1"/>
+            </a:fillRef>
+            <a:effectRef idx="0">
+              <a:schemeClr val="dk1"/>
+            </a:effectRef>
+            <a:fontRef idx="minor">
+              <a:schemeClr val="dk1"/>
+            </a:fontRef>
+          </p:style>
+          <p:txBody>
+            <a:bodyPr rtlCol="0" anchor="ctr"/>
+            <a:lstStyle/>
+            <a:p>
+              <a:r>
+                <a:rPr lang="de-CH" sz="1000" dirty="0" err="1"/>
+                <a:t>prodName</a:t>
+              </a:r>
+              <a:endParaRPr lang="de-CH" sz="1000" dirty="0"/>
+            </a:p>
+          </p:txBody>
+        </p:sp>
+        <p:sp>
+          <p:nvSpPr>
+            <p:cNvPr id="38" name="Rechteck 37">
+              <a:extLst>
+                <a:ext uri="{FF2B5EF4-FFF2-40B4-BE49-F238E27FC236}">
+                  <a16:creationId xmlns:a16="http://schemas.microsoft.com/office/drawing/2014/main" id="{4414951A-3357-4A08-99C1-A341607ED4EE}"/>
+                </a:ext>
+              </a:extLst>
+            </p:cNvPr>
+            <p:cNvSpPr/>
+            <p:nvPr/>
+          </p:nvSpPr>
+          <p:spPr>
+            <a:xfrm>
+              <a:off x="4019550" y="2000250"/>
+              <a:ext cx="1300163" cy="209550"/>
+            </a:xfrm>
+            <a:prstGeom prst="rect">
+              <a:avLst/>
+            </a:prstGeom>
+          </p:spPr>
+          <p:style>
+            <a:lnRef idx="2">
+              <a:schemeClr val="dk1"/>
+            </a:lnRef>
+            <a:fillRef idx="1">
+              <a:schemeClr val="lt1"/>
+            </a:fillRef>
+            <a:effectRef idx="0">
+              <a:schemeClr val="dk1"/>
+            </a:effectRef>
+            <a:fontRef idx="minor">
+              <a:schemeClr val="dk1"/>
+            </a:fontRef>
+          </p:style>
+          <p:txBody>
+            <a:bodyPr rtlCol="0" anchor="ctr"/>
+            <a:lstStyle/>
+            <a:p>
+              <a:r>
+                <a:rPr lang="de-CH" sz="1000" dirty="0"/>
+                <a:t>date</a:t>
+              </a:r>
+            </a:p>
+          </p:txBody>
+        </p:sp>
+        <p:sp>
+          <p:nvSpPr>
+            <p:cNvPr id="39" name="Rechteck 38">
+              <a:extLst>
+                <a:ext uri="{FF2B5EF4-FFF2-40B4-BE49-F238E27FC236}">
+                  <a16:creationId xmlns:a16="http://schemas.microsoft.com/office/drawing/2014/main" id="{69507966-9E7E-417D-B3DB-F6C8E5E8132C}"/>
+                </a:ext>
+              </a:extLst>
+            </p:cNvPr>
+            <p:cNvSpPr/>
+            <p:nvPr/>
+          </p:nvSpPr>
+          <p:spPr>
+            <a:xfrm>
+              <a:off x="4019550" y="2209800"/>
+              <a:ext cx="1300163" cy="209550"/>
+            </a:xfrm>
+            <a:prstGeom prst="rect">
+              <a:avLst/>
+            </a:prstGeom>
+          </p:spPr>
+          <p:style>
+            <a:lnRef idx="2">
+              <a:schemeClr val="dk1"/>
+            </a:lnRef>
+            <a:fillRef idx="1">
+              <a:schemeClr val="lt1"/>
+            </a:fillRef>
+            <a:effectRef idx="0">
+              <a:schemeClr val="dk1"/>
+            </a:effectRef>
+            <a:fontRef idx="minor">
+              <a:schemeClr val="dk1"/>
+            </a:fontRef>
+          </p:style>
+          <p:txBody>
+            <a:bodyPr rtlCol="0" anchor="ctr"/>
+            <a:lstStyle/>
+            <a:p>
+              <a:r>
+                <a:rPr lang="de-CH" sz="1000" dirty="0" err="1"/>
+                <a:t>effectiveprice</a:t>
+              </a:r>
+              <a:endParaRPr lang="de-CH" sz="1000" dirty="0"/>
+            </a:p>
+          </p:txBody>
+        </p:sp>
+      </p:grpSp>
+      <p:sp>
+        <p:nvSpPr>
+          <p:cNvPr id="40" name="Sprechblase: rechteckig 39">
+            <a:extLst>
+              <a:ext uri="{FF2B5EF4-FFF2-40B4-BE49-F238E27FC236}">
+                <a16:creationId xmlns:a16="http://schemas.microsoft.com/office/drawing/2014/main" id="{EF15EDCD-30CB-487B-AE15-1C8072C267E2}"/>
+              </a:ext>
+            </a:extLst>
+          </p:cNvPr>
+          <p:cNvSpPr/>
+          <p:nvPr/>
+        </p:nvSpPr>
+        <p:spPr>
+          <a:xfrm>
+            <a:off x="3224462" y="4178969"/>
+            <a:ext cx="1227221" cy="793082"/>
+          </a:xfrm>
+          <a:prstGeom prst="wedgeRectCallout">
+            <a:avLst>
+              <a:gd name="adj1" fmla="val 105311"/>
+              <a:gd name="adj2" fmla="val -77061"/>
+            </a:avLst>
+          </a:prstGeom>
+        </p:spPr>
+        <p:style>
+          <a:lnRef idx="2">
+            <a:schemeClr val="accent4">
+              <a:shade val="50000"/>
+            </a:schemeClr>
+          </a:lnRef>
+          <a:fillRef idx="1">
+            <a:schemeClr val="accent4"/>
+          </a:fillRef>
+          <a:effectRef idx="0">
+            <a:schemeClr val="accent4"/>
+          </a:effectRef>
+          <a:fontRef idx="minor">
+            <a:schemeClr val="lt1"/>
+          </a:fontRef>
+        </p:style>
+        <p:txBody>
+          <a:bodyPr rtlCol="0" anchor="ctr"/>
+          <a:lstStyle/>
+          <a:p>
+            <a:pPr algn="ctr"/>
+            <a:r>
+              <a:rPr lang="de-CH" sz="1000" dirty="0"/>
+              <a:t>View Model. Aus Zeitgründen wird nur dieses Model für das </a:t>
+            </a:r>
+            <a:r>
+              <a:rPr lang="de-CH" sz="1000" dirty="0" err="1"/>
+              <a:t>Prototyping</a:t>
+            </a:r>
+            <a:r>
+              <a:rPr lang="de-CH" sz="1000" dirty="0"/>
+              <a:t> implementiert</a:t>
             </a:r>
           </a:p>
         </p:txBody>

</xml_diff>

<commit_message>
added sum functions, some cleanup (not much though...), finished documentation
</commit_message>
<xml_diff>
--- a/doc/Visuals.pptx
+++ b/doc/Visuals.pptx
@@ -4977,16 +4977,12 @@
           <a:p>
             <a:pPr algn="ctr"/>
             <a:r>
+              <a:rPr lang="de-CH" dirty="0" err="1"/>
+              <a:t>Postgres</a:t>
+            </a:r>
+            <a:r>
               <a:rPr lang="de-CH" dirty="0"/>
-              <a:t>&lt;</a:t>
-            </a:r>
-            <a:r>
-              <a:rPr lang="de-CH" dirty="0" err="1"/>
-              <a:t>Tbd</a:t>
-            </a:r>
-            <a:r>
-              <a:rPr lang="de-CH" dirty="0"/>
-              <a:t>&gt;</a:t>
+              <a:t> in Memory</a:t>
             </a:r>
           </a:p>
         </p:txBody>
@@ -5405,15 +5401,7 @@
             <a:pPr algn="ctr"/>
             <a:r>
               <a:rPr lang="de-CH" sz="1400" dirty="0"/>
-              <a:t>&lt;</a:t>
-            </a:r>
-            <a:r>
-              <a:rPr lang="de-CH" sz="1400" dirty="0" err="1"/>
-              <a:t>tbd</a:t>
-            </a:r>
-            <a:r>
-              <a:rPr lang="de-CH" sz="1400" dirty="0"/>
-              <a:t>&gt;, Spring Data?</a:t>
+              <a:t>Spring Data &amp; JPA</a:t>
             </a:r>
           </a:p>
         </p:txBody>

</xml_diff>